<commit_message>
edit project pictures v2
</commit_message>
<xml_diff>
--- a/project image.pptx
+++ b/project image.pptx
@@ -11369,8 +11369,8 @@
         </p:nvSpPr>
         <p:spPr>
           <a:xfrm>
-            <a:off x="1658315" y="1619368"/>
-            <a:ext cx="5959311" cy="2308324"/>
+            <a:off x="1729799" y="1619368"/>
+            <a:ext cx="5754651" cy="2308324"/>
           </a:xfrm>
           <a:prstGeom prst="rect">
             <a:avLst/>
@@ -11384,7 +11384,7 @@
           <a:lstStyle/>
           <a:p>
             <a:r>
-              <a:rPr lang="en-US" sz="7200" b="1" i="0" dirty="0">
+              <a:rPr lang="en-US" sz="7000" b="1" i="0" dirty="0">
                 <a:solidFill>
                   <a:srgbClr val="AD5545"/>
                 </a:solidFill>
@@ -11395,7 +11395,7 @@
               <a:t>Multi-User </a:t>
             </a:r>
             <a:r>
-              <a:rPr lang="en-US" sz="7200" b="1" i="0" dirty="0">
+              <a:rPr lang="en-US" sz="7000" b="1" i="0" dirty="0">
                 <a:effectLst/>
                 <a:latin typeface="Bangla MN" pitchFamily="2" charset="0"/>
                 <a:cs typeface="Bangla MN" pitchFamily="2" charset="0"/>

</xml_diff>

<commit_message>
edit skills's ring color
</commit_message>
<xml_diff>
--- a/project image.pptx
+++ b/project image.pptx
@@ -5,7 +5,7 @@
     <p:sldMasterId id="2147483660" r:id="rId1"/>
   </p:sldMasterIdLst>
   <p:notesMasterIdLst>
-    <p:notesMasterId r:id="rId11"/>
+    <p:notesMasterId r:id="rId12"/>
   </p:notesMasterIdLst>
   <p:sldIdLst>
     <p:sldId id="263" r:id="rId2"/>
@@ -16,7 +16,8 @@
     <p:sldId id="261" r:id="rId7"/>
     <p:sldId id="262" r:id="rId8"/>
     <p:sldId id="266" r:id="rId9"/>
-    <p:sldId id="267" r:id="rId10"/>
+    <p:sldId id="268" r:id="rId10"/>
+    <p:sldId id="267" r:id="rId11"/>
   </p:sldIdLst>
   <p:sldSz cx="9144000" cy="6858000" type="screen4x3"/>
   <p:notesSz cx="6858000" cy="9144000"/>
@@ -115,6 +116,11 @@
       </a:defRPr>
     </a:lvl9pPr>
   </p:defaultTextStyle>
+  <p:extLst>
+    <p:ext uri="{EFAFB233-063F-42B5-8137-9DF3F51BA10A}">
+      <p15:sldGuideLst xmlns:p15="http://schemas.microsoft.com/office/powerpoint/2012/main"/>
+    </p:ext>
+  </p:extLst>
 </p:presentation>
 </file>
 
@@ -200,7 +206,7 @@
           <a:p>
             <a:fld id="{B984E005-AECD-D649-A0E6-7B84A89EEE7F}" type="datetimeFigureOut">
               <a:rPr lang="en-TW" smtClean="0"/>
-              <a:t>2023/7/1</a:t>
+              <a:t>2023/7/2</a:t>
             </a:fld>
             <a:endParaRPr lang="en-TW"/>
           </a:p>
@@ -557,6 +563,95 @@
 </p:notes>
 </file>
 
+<file path=ppt/notesSlides/notesSlide10.xml><?xml version="1.0" encoding="utf-8"?>
+<p:notes xmlns:a="http://schemas.openxmlformats.org/drawingml/2006/main" xmlns:r="http://schemas.openxmlformats.org/officeDocument/2006/relationships" xmlns:p="http://schemas.openxmlformats.org/presentationml/2006/main">
+  <p:cSld>
+    <p:spTree>
+      <p:nvGrpSpPr>
+        <p:cNvPr id="1" name=""/>
+        <p:cNvGrpSpPr/>
+        <p:nvPr/>
+      </p:nvGrpSpPr>
+      <p:grpSpPr>
+        <a:xfrm>
+          <a:off x="0" y="0"/>
+          <a:ext cx="0" cy="0"/>
+          <a:chOff x="0" y="0"/>
+          <a:chExt cx="0" cy="0"/>
+        </a:xfrm>
+      </p:grpSpPr>
+      <p:sp>
+        <p:nvSpPr>
+          <p:cNvPr id="2" name="Slide Image Placeholder 1"/>
+          <p:cNvSpPr>
+            <a:spLocks noGrp="1" noRot="1" noChangeAspect="1"/>
+          </p:cNvSpPr>
+          <p:nvPr>
+            <p:ph type="sldImg"/>
+          </p:nvPr>
+        </p:nvSpPr>
+        <p:spPr>
+          <a:xfrm>
+            <a:off x="1371600" y="1143000"/>
+            <a:ext cx="4114800" cy="3086100"/>
+          </a:xfrm>
+        </p:spPr>
+      </p:sp>
+      <p:sp>
+        <p:nvSpPr>
+          <p:cNvPr id="3" name="Notes Placeholder 2"/>
+          <p:cNvSpPr>
+            <a:spLocks noGrp="1"/>
+          </p:cNvSpPr>
+          <p:nvPr>
+            <p:ph type="body" idx="1"/>
+          </p:nvPr>
+        </p:nvSpPr>
+        <p:spPr/>
+        <p:txBody>
+          <a:bodyPr/>
+          <a:lstStyle/>
+          <a:p>
+            <a:endParaRPr lang="en-TW" dirty="0"/>
+          </a:p>
+        </p:txBody>
+      </p:sp>
+      <p:sp>
+        <p:nvSpPr>
+          <p:cNvPr id="4" name="Slide Number Placeholder 3"/>
+          <p:cNvSpPr>
+            <a:spLocks noGrp="1"/>
+          </p:cNvSpPr>
+          <p:nvPr>
+            <p:ph type="sldNum" sz="quarter" idx="5"/>
+          </p:nvPr>
+        </p:nvSpPr>
+        <p:spPr/>
+        <p:txBody>
+          <a:bodyPr/>
+          <a:lstStyle/>
+          <a:p>
+            <a:fld id="{BE4677E2-809D-D444-8BE4-D4BE08F1B023}" type="slidenum">
+              <a:rPr lang="en-TW" smtClean="0"/>
+              <a:t>10</a:t>
+            </a:fld>
+            <a:endParaRPr lang="en-TW"/>
+          </a:p>
+        </p:txBody>
+      </p:sp>
+    </p:spTree>
+    <p:extLst>
+      <p:ext uri="{BB962C8B-B14F-4D97-AF65-F5344CB8AC3E}">
+        <p14:creationId xmlns:p14="http://schemas.microsoft.com/office/powerpoint/2010/main" val="4104857933"/>
+      </p:ext>
+    </p:extLst>
+  </p:cSld>
+  <p:clrMapOvr>
+    <a:masterClrMapping/>
+  </p:clrMapOvr>
+</p:notes>
+</file>
+
 <file path=ppt/notesSlides/notesSlide2.xml><?xml version="1.0" encoding="utf-8"?>
 <p:notes xmlns:a="http://schemas.openxmlformats.org/drawingml/2006/main" xmlns:r="http://schemas.openxmlformats.org/officeDocument/2006/relationships" xmlns:p="http://schemas.openxmlformats.org/presentationml/2006/main">
   <p:cSld>
@@ -1259,7 +1354,7 @@
     </p:spTree>
     <p:extLst>
       <p:ext uri="{BB962C8B-B14F-4D97-AF65-F5344CB8AC3E}">
-        <p14:creationId xmlns:p14="http://schemas.microsoft.com/office/powerpoint/2010/main" val="4104857933"/>
+        <p14:creationId xmlns:p14="http://schemas.microsoft.com/office/powerpoint/2010/main" val="3070475224"/>
       </p:ext>
     </p:extLst>
   </p:cSld>
@@ -1400,7 +1495,7 @@
           <a:p>
             <a:fld id="{A639FD2D-648F-3147-B6C2-C6D884B6DA53}" type="datetimeFigureOut">
               <a:rPr lang="en-TW" smtClean="0"/>
-              <a:t>2023/7/1</a:t>
+              <a:t>2023/7/2</a:t>
             </a:fld>
             <a:endParaRPr lang="en-TW"/>
           </a:p>
@@ -1570,7 +1665,7 @@
           <a:p>
             <a:fld id="{A639FD2D-648F-3147-B6C2-C6D884B6DA53}" type="datetimeFigureOut">
               <a:rPr lang="en-TW" smtClean="0"/>
-              <a:t>2023/7/1</a:t>
+              <a:t>2023/7/2</a:t>
             </a:fld>
             <a:endParaRPr lang="en-TW"/>
           </a:p>
@@ -1750,7 +1845,7 @@
           <a:p>
             <a:fld id="{A639FD2D-648F-3147-B6C2-C6D884B6DA53}" type="datetimeFigureOut">
               <a:rPr lang="en-TW" smtClean="0"/>
-              <a:t>2023/7/1</a:t>
+              <a:t>2023/7/2</a:t>
             </a:fld>
             <a:endParaRPr lang="en-TW"/>
           </a:p>
@@ -1920,7 +2015,7 @@
           <a:p>
             <a:fld id="{A639FD2D-648F-3147-B6C2-C6D884B6DA53}" type="datetimeFigureOut">
               <a:rPr lang="en-TW" smtClean="0"/>
-              <a:t>2023/7/1</a:t>
+              <a:t>2023/7/2</a:t>
             </a:fld>
             <a:endParaRPr lang="en-TW"/>
           </a:p>
@@ -2164,7 +2259,7 @@
           <a:p>
             <a:fld id="{A639FD2D-648F-3147-B6C2-C6D884B6DA53}" type="datetimeFigureOut">
               <a:rPr lang="en-TW" smtClean="0"/>
-              <a:t>2023/7/1</a:t>
+              <a:t>2023/7/2</a:t>
             </a:fld>
             <a:endParaRPr lang="en-TW"/>
           </a:p>
@@ -2396,7 +2491,7 @@
           <a:p>
             <a:fld id="{A639FD2D-648F-3147-B6C2-C6D884B6DA53}" type="datetimeFigureOut">
               <a:rPr lang="en-TW" smtClean="0"/>
-              <a:t>2023/7/1</a:t>
+              <a:t>2023/7/2</a:t>
             </a:fld>
             <a:endParaRPr lang="en-TW"/>
           </a:p>
@@ -2763,7 +2858,7 @@
           <a:p>
             <a:fld id="{A639FD2D-648F-3147-B6C2-C6D884B6DA53}" type="datetimeFigureOut">
               <a:rPr lang="en-TW" smtClean="0"/>
-              <a:t>2023/7/1</a:t>
+              <a:t>2023/7/2</a:t>
             </a:fld>
             <a:endParaRPr lang="en-TW"/>
           </a:p>
@@ -2881,7 +2976,7 @@
           <a:p>
             <a:fld id="{A639FD2D-648F-3147-B6C2-C6D884B6DA53}" type="datetimeFigureOut">
               <a:rPr lang="en-TW" smtClean="0"/>
-              <a:t>2023/7/1</a:t>
+              <a:t>2023/7/2</a:t>
             </a:fld>
             <a:endParaRPr lang="en-TW"/>
           </a:p>
@@ -2976,7 +3071,7 @@
           <a:p>
             <a:fld id="{A639FD2D-648F-3147-B6C2-C6D884B6DA53}" type="datetimeFigureOut">
               <a:rPr lang="en-TW" smtClean="0"/>
-              <a:t>2023/7/1</a:t>
+              <a:t>2023/7/2</a:t>
             </a:fld>
             <a:endParaRPr lang="en-TW"/>
           </a:p>
@@ -3253,7 +3348,7 @@
           <a:p>
             <a:fld id="{A639FD2D-648F-3147-B6C2-C6D884B6DA53}" type="datetimeFigureOut">
               <a:rPr lang="en-TW" smtClean="0"/>
-              <a:t>2023/7/1</a:t>
+              <a:t>2023/7/2</a:t>
             </a:fld>
             <a:endParaRPr lang="en-TW"/>
           </a:p>
@@ -3509,7 +3604,7 @@
           <a:p>
             <a:fld id="{A639FD2D-648F-3147-B6C2-C6D884B6DA53}" type="datetimeFigureOut">
               <a:rPr lang="en-TW" smtClean="0"/>
-              <a:t>2023/7/1</a:t>
+              <a:t>2023/7/2</a:t>
             </a:fld>
             <a:endParaRPr lang="en-TW"/>
           </a:p>
@@ -3722,7 +3817,7 @@
           <a:p>
             <a:fld id="{A639FD2D-648F-3147-B6C2-C6D884B6DA53}" type="datetimeFigureOut">
               <a:rPr lang="en-TW" smtClean="0"/>
-              <a:t>2023/7/1</a:t>
+              <a:t>2023/7/2</a:t>
             </a:fld>
             <a:endParaRPr lang="en-TW"/>
           </a:p>
@@ -5406,6 +5501,116 @@
     <p:extLst>
       <p:ext uri="{BB962C8B-B14F-4D97-AF65-F5344CB8AC3E}">
         <p14:creationId xmlns:p14="http://schemas.microsoft.com/office/powerpoint/2010/main" val="1758696733"/>
+      </p:ext>
+    </p:extLst>
+  </p:cSld>
+  <p:clrMapOvr>
+    <a:masterClrMapping/>
+  </p:clrMapOvr>
+</p:sld>
+</file>
+
+<file path=ppt/slides/slide10.xml><?xml version="1.0" encoding="utf-8"?>
+<p:sld xmlns:a="http://schemas.openxmlformats.org/drawingml/2006/main" xmlns:r="http://schemas.openxmlformats.org/officeDocument/2006/relationships" xmlns:p="http://schemas.openxmlformats.org/presentationml/2006/main">
+  <p:cSld>
+    <p:spTree>
+      <p:nvGrpSpPr>
+        <p:cNvPr id="1" name=""/>
+        <p:cNvGrpSpPr/>
+        <p:nvPr/>
+      </p:nvGrpSpPr>
+      <p:grpSpPr>
+        <a:xfrm>
+          <a:off x="0" y="0"/>
+          <a:ext cx="0" cy="0"/>
+          <a:chOff x="0" y="0"/>
+          <a:chExt cx="0" cy="0"/>
+        </a:xfrm>
+      </p:grpSpPr>
+      <p:grpSp>
+        <p:nvGrpSpPr>
+          <p:cNvPr id="45" name="Group 44">
+            <a:extLst>
+              <a:ext uri="{FF2B5EF4-FFF2-40B4-BE49-F238E27FC236}">
+                <a16:creationId xmlns:a16="http://schemas.microsoft.com/office/drawing/2014/main" id="{6850542D-4877-9BA1-8556-26DFF924516B}"/>
+              </a:ext>
+            </a:extLst>
+          </p:cNvPr>
+          <p:cNvGrpSpPr/>
+          <p:nvPr/>
+        </p:nvGrpSpPr>
+        <p:grpSpPr>
+          <a:xfrm>
+            <a:off x="0" y="-5766"/>
+            <a:ext cx="9144000" cy="6863766"/>
+            <a:chOff x="0" y="-5766"/>
+            <a:chExt cx="9144000" cy="6863766"/>
+          </a:xfrm>
+        </p:grpSpPr>
+        <p:pic>
+          <p:nvPicPr>
+            <p:cNvPr id="4" name="Picture 3">
+              <a:extLst>
+                <a:ext uri="{FF2B5EF4-FFF2-40B4-BE49-F238E27FC236}">
+                  <a16:creationId xmlns:a16="http://schemas.microsoft.com/office/drawing/2014/main" id="{617996B7-90C5-BBCA-EC71-F8CDCB05A259}"/>
+                </a:ext>
+              </a:extLst>
+            </p:cNvPr>
+            <p:cNvPicPr>
+              <a:picLocks noChangeAspect="1"/>
+            </p:cNvPicPr>
+            <p:nvPr/>
+          </p:nvPicPr>
+          <p:blipFill>
+            <a:blip r:embed="rId3"/>
+            <a:stretch>
+              <a:fillRect/>
+            </a:stretch>
+          </p:blipFill>
+          <p:spPr>
+            <a:xfrm>
+              <a:off x="0" y="-5766"/>
+              <a:ext cx="9144000" cy="5143501"/>
+            </a:xfrm>
+            <a:prstGeom prst="rect">
+              <a:avLst/>
+            </a:prstGeom>
+          </p:spPr>
+        </p:pic>
+        <p:pic>
+          <p:nvPicPr>
+            <p:cNvPr id="44" name="Picture 43">
+              <a:extLst>
+                <a:ext uri="{FF2B5EF4-FFF2-40B4-BE49-F238E27FC236}">
+                  <a16:creationId xmlns:a16="http://schemas.microsoft.com/office/drawing/2014/main" id="{2924ACC8-D04C-D4DE-DA9C-A2F2B02E5E77}"/>
+                </a:ext>
+              </a:extLst>
+            </p:cNvPr>
+            <p:cNvPicPr>
+              <a:picLocks noChangeAspect="1"/>
+            </p:cNvPicPr>
+            <p:nvPr/>
+          </p:nvPicPr>
+          <p:blipFill rotWithShape="1">
+            <a:blip r:embed="rId3"/>
+            <a:srcRect t="28009"/>
+            <a:stretch/>
+          </p:blipFill>
+          <p:spPr>
+            <a:xfrm>
+              <a:off x="0" y="3155147"/>
+              <a:ext cx="9144000" cy="3702853"/>
+            </a:xfrm>
+            <a:prstGeom prst="rect">
+              <a:avLst/>
+            </a:prstGeom>
+          </p:spPr>
+        </p:pic>
+      </p:grpSp>
+    </p:spTree>
+    <p:extLst>
+      <p:ext uri="{BB962C8B-B14F-4D97-AF65-F5344CB8AC3E}">
+        <p14:creationId xmlns:p14="http://schemas.microsoft.com/office/powerpoint/2010/main" val="177634898"/>
       </p:ext>
     </p:extLst>
   </p:cSld>
@@ -12016,12 +12221,41 @@
           <a:chExt cx="0" cy="0"/>
         </a:xfrm>
       </p:grpSpPr>
+      <p:pic>
+        <p:nvPicPr>
+          <p:cNvPr id="2" name="Picture 1">
+            <a:extLst>
+              <a:ext uri="{FF2B5EF4-FFF2-40B4-BE49-F238E27FC236}">
+                <a16:creationId xmlns:a16="http://schemas.microsoft.com/office/drawing/2014/main" id="{F8D542F6-2406-0E87-EBC8-FA9A14EE0A17}"/>
+              </a:ext>
+            </a:extLst>
+          </p:cNvPr>
+          <p:cNvPicPr>
+            <a:picLocks noChangeAspect="1"/>
+          </p:cNvPicPr>
+          <p:nvPr/>
+        </p:nvPicPr>
+        <p:blipFill rotWithShape="1">
+          <a:blip r:embed="rId3"/>
+          <a:srcRect l="35534"/>
+          <a:stretch/>
+        </p:blipFill>
+        <p:spPr>
+          <a:xfrm>
+            <a:off x="2899" y="0"/>
+            <a:ext cx="9141101" cy="6858000"/>
+          </a:xfrm>
+          <a:prstGeom prst="rect">
+            <a:avLst/>
+          </a:prstGeom>
+        </p:spPr>
+      </p:pic>
       <p:grpSp>
         <p:nvGrpSpPr>
-          <p:cNvPr id="9" name="Group 8">
+          <p:cNvPr id="3" name="Group 2">
             <a:extLst>
               <a:ext uri="{FF2B5EF4-FFF2-40B4-BE49-F238E27FC236}">
-                <a16:creationId xmlns:a16="http://schemas.microsoft.com/office/drawing/2014/main" id="{41762E55-E1BF-2D4D-0DE0-3DB1349BA454}"/>
+                <a16:creationId xmlns:a16="http://schemas.microsoft.com/office/drawing/2014/main" id="{9451E72E-91BA-FF8A-B9C3-95BE14F05015}"/>
               </a:ext>
             </a:extLst>
           </p:cNvPr>
@@ -12030,218 +12264,168 @@
         </p:nvGrpSpPr>
         <p:grpSpPr>
           <a:xfrm>
-            <a:off x="-1" y="-273209"/>
-            <a:ext cx="9141101" cy="7131209"/>
-            <a:chOff x="-1" y="-273209"/>
-            <a:chExt cx="9141101" cy="7131209"/>
+            <a:off x="379419" y="352145"/>
+            <a:ext cx="1336505" cy="362347"/>
+            <a:chOff x="443753" y="181173"/>
+            <a:chExt cx="1336505" cy="362347"/>
           </a:xfrm>
         </p:grpSpPr>
-        <p:pic>
-          <p:nvPicPr>
-            <p:cNvPr id="2" name="Picture 1">
+        <p:sp>
+          <p:nvSpPr>
+            <p:cNvPr id="5" name="Oval 4">
               <a:extLst>
                 <a:ext uri="{FF2B5EF4-FFF2-40B4-BE49-F238E27FC236}">
-                  <a16:creationId xmlns:a16="http://schemas.microsoft.com/office/drawing/2014/main" id="{F8D542F6-2406-0E87-EBC8-FA9A14EE0A17}"/>
+                  <a16:creationId xmlns:a16="http://schemas.microsoft.com/office/drawing/2014/main" id="{2B2D43F3-AB0F-7F24-E656-DA1521E7CAAC}"/>
                 </a:ext>
               </a:extLst>
             </p:cNvPr>
-            <p:cNvPicPr>
-              <a:picLocks noChangeAspect="1"/>
-            </p:cNvPicPr>
+            <p:cNvSpPr/>
             <p:nvPr/>
-          </p:nvPicPr>
-          <p:blipFill rotWithShape="1">
-            <a:blip r:embed="rId3"/>
-            <a:srcRect l="35534"/>
-            <a:stretch/>
-          </p:blipFill>
+          </p:nvSpPr>
           <p:spPr>
             <a:xfrm>
-              <a:off x="-1" y="-273209"/>
-              <a:ext cx="9141101" cy="7131209"/>
+              <a:off x="443753" y="181173"/>
+              <a:ext cx="362347" cy="362347"/>
             </a:xfrm>
-            <a:prstGeom prst="rect">
+            <a:prstGeom prst="ellipse">
               <a:avLst/>
             </a:prstGeom>
+            <a:solidFill>
+              <a:srgbClr val="FF5F57"/>
+            </a:solidFill>
+            <a:ln>
+              <a:noFill/>
+            </a:ln>
           </p:spPr>
-        </p:pic>
-        <p:grpSp>
-          <p:nvGrpSpPr>
-            <p:cNvPr id="8" name="Group 7">
+          <p:style>
+            <a:lnRef idx="2">
+              <a:schemeClr val="accent1">
+                <a:shade val="15000"/>
+              </a:schemeClr>
+            </a:lnRef>
+            <a:fillRef idx="1">
+              <a:schemeClr val="accent1"/>
+            </a:fillRef>
+            <a:effectRef idx="0">
+              <a:schemeClr val="accent1"/>
+            </a:effectRef>
+            <a:fontRef idx="minor">
+              <a:schemeClr val="lt1"/>
+            </a:fontRef>
+          </p:style>
+          <p:txBody>
+            <a:bodyPr rtlCol="0" anchor="ctr"/>
+            <a:lstStyle/>
+            <a:p>
+              <a:pPr algn="ctr"/>
+              <a:endParaRPr lang="en-TW"/>
+            </a:p>
+          </p:txBody>
+        </p:sp>
+        <p:sp>
+          <p:nvSpPr>
+            <p:cNvPr id="10" name="Oval 9">
               <a:extLst>
                 <a:ext uri="{FF2B5EF4-FFF2-40B4-BE49-F238E27FC236}">
-                  <a16:creationId xmlns:a16="http://schemas.microsoft.com/office/drawing/2014/main" id="{2858C3C5-EBFF-30B6-B61B-9A16671B188E}"/>
+                  <a16:creationId xmlns:a16="http://schemas.microsoft.com/office/drawing/2014/main" id="{60A43D14-464C-FA32-F1B8-54A629B2C969}"/>
                 </a:ext>
               </a:extLst>
             </p:cNvPr>
-            <p:cNvGrpSpPr/>
+            <p:cNvSpPr/>
             <p:nvPr/>
-          </p:nvGrpSpPr>
-          <p:grpSpPr>
+          </p:nvSpPr>
+          <p:spPr>
             <a:xfrm>
-              <a:off x="379419" y="80682"/>
-              <a:ext cx="1336505" cy="362347"/>
-              <a:chOff x="443753" y="181173"/>
-              <a:chExt cx="1336505" cy="362347"/>
+              <a:off x="930832" y="181173"/>
+              <a:ext cx="362347" cy="362347"/>
             </a:xfrm>
-          </p:grpSpPr>
-          <p:sp>
-            <p:nvSpPr>
-              <p:cNvPr id="4" name="Oval 3">
-                <a:extLst>
-                  <a:ext uri="{FF2B5EF4-FFF2-40B4-BE49-F238E27FC236}">
-                    <a16:creationId xmlns:a16="http://schemas.microsoft.com/office/drawing/2014/main" id="{5B621C08-1836-737E-B335-36A6734E6810}"/>
-                  </a:ext>
-                </a:extLst>
-              </p:cNvPr>
-              <p:cNvSpPr/>
-              <p:nvPr/>
-            </p:nvSpPr>
-            <p:spPr>
-              <a:xfrm>
-                <a:off x="443753" y="181173"/>
-                <a:ext cx="362347" cy="362347"/>
-              </a:xfrm>
-              <a:prstGeom prst="ellipse">
-                <a:avLst/>
-              </a:prstGeom>
-              <a:solidFill>
-                <a:srgbClr val="FF5F57"/>
-              </a:solidFill>
-              <a:ln>
-                <a:noFill/>
-              </a:ln>
-            </p:spPr>
-            <p:style>
-              <a:lnRef idx="2">
-                <a:schemeClr val="accent1">
-                  <a:shade val="15000"/>
-                </a:schemeClr>
-              </a:lnRef>
-              <a:fillRef idx="1">
-                <a:schemeClr val="accent1"/>
-              </a:fillRef>
-              <a:effectRef idx="0">
-                <a:schemeClr val="accent1"/>
-              </a:effectRef>
-              <a:fontRef idx="minor">
-                <a:schemeClr val="lt1"/>
-              </a:fontRef>
-            </p:style>
-            <p:txBody>
-              <a:bodyPr rtlCol="0" anchor="ctr"/>
-              <a:lstStyle/>
-              <a:p>
-                <a:pPr algn="ctr"/>
-                <a:endParaRPr lang="en-TW"/>
-              </a:p>
-            </p:txBody>
-          </p:sp>
-          <p:sp>
-            <p:nvSpPr>
-              <p:cNvPr id="6" name="Oval 5">
-                <a:extLst>
-                  <a:ext uri="{FF2B5EF4-FFF2-40B4-BE49-F238E27FC236}">
-                    <a16:creationId xmlns:a16="http://schemas.microsoft.com/office/drawing/2014/main" id="{0D3ADC91-3D1A-E467-4C00-58DC6F06BB50}"/>
-                  </a:ext>
-                </a:extLst>
-              </p:cNvPr>
-              <p:cNvSpPr/>
-              <p:nvPr/>
-            </p:nvSpPr>
-            <p:spPr>
-              <a:xfrm>
-                <a:off x="930832" y="181173"/>
-                <a:ext cx="362347" cy="362347"/>
-              </a:xfrm>
-              <a:prstGeom prst="ellipse">
-                <a:avLst/>
-              </a:prstGeom>
-              <a:solidFill>
-                <a:srgbClr val="FEBD2E"/>
-              </a:solidFill>
-              <a:ln>
-                <a:noFill/>
-              </a:ln>
-            </p:spPr>
-            <p:style>
-              <a:lnRef idx="2">
-                <a:schemeClr val="accent1">
-                  <a:shade val="15000"/>
-                </a:schemeClr>
-              </a:lnRef>
-              <a:fillRef idx="1">
-                <a:schemeClr val="accent1"/>
-              </a:fillRef>
-              <a:effectRef idx="0">
-                <a:schemeClr val="accent1"/>
-              </a:effectRef>
-              <a:fontRef idx="minor">
-                <a:schemeClr val="lt1"/>
-              </a:fontRef>
-            </p:style>
-            <p:txBody>
-              <a:bodyPr rtlCol="0" anchor="ctr"/>
-              <a:lstStyle/>
-              <a:p>
-                <a:pPr algn="ctr"/>
-                <a:endParaRPr lang="en-TW"/>
-              </a:p>
-            </p:txBody>
-          </p:sp>
-          <p:sp>
-            <p:nvSpPr>
-              <p:cNvPr id="7" name="Oval 6">
-                <a:extLst>
-                  <a:ext uri="{FF2B5EF4-FFF2-40B4-BE49-F238E27FC236}">
-                    <a16:creationId xmlns:a16="http://schemas.microsoft.com/office/drawing/2014/main" id="{FE074333-2D3E-C79E-F0B8-D89DB6C4876C}"/>
-                  </a:ext>
-                </a:extLst>
-              </p:cNvPr>
-              <p:cNvSpPr/>
-              <p:nvPr/>
-            </p:nvSpPr>
-            <p:spPr>
-              <a:xfrm>
-                <a:off x="1417911" y="181173"/>
-                <a:ext cx="362347" cy="362347"/>
-              </a:xfrm>
-              <a:prstGeom prst="ellipse">
-                <a:avLst/>
-              </a:prstGeom>
-              <a:solidFill>
-                <a:srgbClr val="27C841"/>
-              </a:solidFill>
-              <a:ln>
-                <a:noFill/>
-              </a:ln>
-            </p:spPr>
-            <p:style>
-              <a:lnRef idx="2">
-                <a:schemeClr val="accent1">
-                  <a:shade val="15000"/>
-                </a:schemeClr>
-              </a:lnRef>
-              <a:fillRef idx="1">
-                <a:schemeClr val="accent1"/>
-              </a:fillRef>
-              <a:effectRef idx="0">
-                <a:schemeClr val="accent1"/>
-              </a:effectRef>
-              <a:fontRef idx="minor">
-                <a:schemeClr val="lt1"/>
-              </a:fontRef>
-            </p:style>
-            <p:txBody>
-              <a:bodyPr rtlCol="0" anchor="ctr"/>
-              <a:lstStyle/>
-              <a:p>
-                <a:pPr algn="ctr"/>
-                <a:endParaRPr lang="en-TW"/>
-              </a:p>
-            </p:txBody>
-          </p:sp>
-        </p:grpSp>
+            <a:prstGeom prst="ellipse">
+              <a:avLst/>
+            </a:prstGeom>
+            <a:solidFill>
+              <a:srgbClr val="FEBD2E"/>
+            </a:solidFill>
+            <a:ln>
+              <a:noFill/>
+            </a:ln>
+          </p:spPr>
+          <p:style>
+            <a:lnRef idx="2">
+              <a:schemeClr val="accent1">
+                <a:shade val="15000"/>
+              </a:schemeClr>
+            </a:lnRef>
+            <a:fillRef idx="1">
+              <a:schemeClr val="accent1"/>
+            </a:fillRef>
+            <a:effectRef idx="0">
+              <a:schemeClr val="accent1"/>
+            </a:effectRef>
+            <a:fontRef idx="minor">
+              <a:schemeClr val="lt1"/>
+            </a:fontRef>
+          </p:style>
+          <p:txBody>
+            <a:bodyPr rtlCol="0" anchor="ctr"/>
+            <a:lstStyle/>
+            <a:p>
+              <a:pPr algn="ctr"/>
+              <a:endParaRPr lang="en-TW"/>
+            </a:p>
+          </p:txBody>
+        </p:sp>
+        <p:sp>
+          <p:nvSpPr>
+            <p:cNvPr id="11" name="Oval 10">
+              <a:extLst>
+                <a:ext uri="{FF2B5EF4-FFF2-40B4-BE49-F238E27FC236}">
+                  <a16:creationId xmlns:a16="http://schemas.microsoft.com/office/drawing/2014/main" id="{09535B96-C9A2-7785-2DCB-65E0C3DB0C4B}"/>
+                </a:ext>
+              </a:extLst>
+            </p:cNvPr>
+            <p:cNvSpPr/>
+            <p:nvPr/>
+          </p:nvSpPr>
+          <p:spPr>
+            <a:xfrm>
+              <a:off x="1417911" y="181173"/>
+              <a:ext cx="362347" cy="362347"/>
+            </a:xfrm>
+            <a:prstGeom prst="ellipse">
+              <a:avLst/>
+            </a:prstGeom>
+            <a:solidFill>
+              <a:srgbClr val="27C841"/>
+            </a:solidFill>
+            <a:ln>
+              <a:noFill/>
+            </a:ln>
+          </p:spPr>
+          <p:style>
+            <a:lnRef idx="2">
+              <a:schemeClr val="accent1">
+                <a:shade val="15000"/>
+              </a:schemeClr>
+            </a:lnRef>
+            <a:fillRef idx="1">
+              <a:schemeClr val="accent1"/>
+            </a:fillRef>
+            <a:effectRef idx="0">
+              <a:schemeClr val="accent1"/>
+            </a:effectRef>
+            <a:fontRef idx="minor">
+              <a:schemeClr val="lt1"/>
+            </a:fontRef>
+          </p:style>
+          <p:txBody>
+            <a:bodyPr rtlCol="0" anchor="ctr"/>
+            <a:lstStyle/>
+            <a:p>
+              <a:pPr algn="ctr"/>
+              <a:endParaRPr lang="en-TW"/>
+            </a:p>
+          </p:txBody>
+        </p:sp>
       </p:grpSp>
     </p:spTree>
     <p:extLst>
@@ -12273,12 +12457,64 @@
           <a:chExt cx="0" cy="0"/>
         </a:xfrm>
       </p:grpSpPr>
+      <p:sp>
+        <p:nvSpPr>
+          <p:cNvPr id="3" name="Rectangle 2">
+            <a:extLst>
+              <a:ext uri="{FF2B5EF4-FFF2-40B4-BE49-F238E27FC236}">
+                <a16:creationId xmlns:a16="http://schemas.microsoft.com/office/drawing/2014/main" id="{301DEAFC-29D4-7BB8-D52B-ED395ADBD232}"/>
+              </a:ext>
+            </a:extLst>
+          </p:cNvPr>
+          <p:cNvSpPr/>
+          <p:nvPr/>
+        </p:nvSpPr>
+        <p:spPr>
+          <a:xfrm>
+            <a:off x="0" y="0"/>
+            <a:ext cx="9144000" cy="6858000"/>
+          </a:xfrm>
+          <a:prstGeom prst="rect">
+            <a:avLst/>
+          </a:prstGeom>
+          <a:solidFill>
+            <a:srgbClr val="E2E6E8"/>
+          </a:solidFill>
+          <a:ln>
+            <a:noFill/>
+          </a:ln>
+        </p:spPr>
+        <p:style>
+          <a:lnRef idx="2">
+            <a:schemeClr val="accent1">
+              <a:shade val="15000"/>
+            </a:schemeClr>
+          </a:lnRef>
+          <a:fillRef idx="1">
+            <a:schemeClr val="accent1"/>
+          </a:fillRef>
+          <a:effectRef idx="0">
+            <a:schemeClr val="accent1"/>
+          </a:effectRef>
+          <a:fontRef idx="minor">
+            <a:schemeClr val="lt1"/>
+          </a:fontRef>
+        </p:style>
+        <p:txBody>
+          <a:bodyPr rtlCol="0" anchor="ctr"/>
+          <a:lstStyle/>
+          <a:p>
+            <a:pPr algn="ctr"/>
+            <a:endParaRPr lang="en-TW"/>
+          </a:p>
+        </p:txBody>
+      </p:sp>
       <p:grpSp>
         <p:nvGrpSpPr>
-          <p:cNvPr id="45" name="Group 44">
+          <p:cNvPr id="8" name="Group 7">
             <a:extLst>
               <a:ext uri="{FF2B5EF4-FFF2-40B4-BE49-F238E27FC236}">
-                <a16:creationId xmlns:a16="http://schemas.microsoft.com/office/drawing/2014/main" id="{6850542D-4877-9BA1-8556-26DFF924516B}"/>
+                <a16:creationId xmlns:a16="http://schemas.microsoft.com/office/drawing/2014/main" id="{2858C3C5-EBFF-30B6-B61B-9A16671B188E}"/>
               </a:ext>
             </a:extLst>
           </p:cNvPr>
@@ -12287,76 +12523,173 @@
         </p:nvGrpSpPr>
         <p:grpSpPr>
           <a:xfrm>
-            <a:off x="0" y="-5766"/>
-            <a:ext cx="9144000" cy="6863766"/>
-            <a:chOff x="0" y="-5766"/>
-            <a:chExt cx="9144000" cy="6863766"/>
+            <a:off x="379419" y="352145"/>
+            <a:ext cx="1336505" cy="362347"/>
+            <a:chOff x="443753" y="181173"/>
+            <a:chExt cx="1336505" cy="362347"/>
           </a:xfrm>
         </p:grpSpPr>
-        <p:pic>
-          <p:nvPicPr>
-            <p:cNvPr id="4" name="Picture 3">
+        <p:sp>
+          <p:nvSpPr>
+            <p:cNvPr id="4" name="Oval 3">
               <a:extLst>
                 <a:ext uri="{FF2B5EF4-FFF2-40B4-BE49-F238E27FC236}">
-                  <a16:creationId xmlns:a16="http://schemas.microsoft.com/office/drawing/2014/main" id="{617996B7-90C5-BBCA-EC71-F8CDCB05A259}"/>
+                  <a16:creationId xmlns:a16="http://schemas.microsoft.com/office/drawing/2014/main" id="{5B621C08-1836-737E-B335-36A6734E6810}"/>
                 </a:ext>
               </a:extLst>
             </p:cNvPr>
-            <p:cNvPicPr>
-              <a:picLocks noChangeAspect="1"/>
-            </p:cNvPicPr>
+            <p:cNvSpPr/>
             <p:nvPr/>
-          </p:nvPicPr>
-          <p:blipFill>
-            <a:blip r:embed="rId3"/>
-            <a:stretch>
-              <a:fillRect/>
-            </a:stretch>
-          </p:blipFill>
+          </p:nvSpPr>
           <p:spPr>
             <a:xfrm>
-              <a:off x="0" y="-5766"/>
-              <a:ext cx="9144000" cy="5143501"/>
+              <a:off x="443753" y="181173"/>
+              <a:ext cx="362347" cy="362347"/>
             </a:xfrm>
-            <a:prstGeom prst="rect">
+            <a:prstGeom prst="ellipse">
               <a:avLst/>
             </a:prstGeom>
+            <a:solidFill>
+              <a:srgbClr val="FF5F57"/>
+            </a:solidFill>
+            <a:ln>
+              <a:noFill/>
+            </a:ln>
           </p:spPr>
-        </p:pic>
-        <p:pic>
-          <p:nvPicPr>
-            <p:cNvPr id="44" name="Picture 43">
+          <p:style>
+            <a:lnRef idx="2">
+              <a:schemeClr val="accent1">
+                <a:shade val="15000"/>
+              </a:schemeClr>
+            </a:lnRef>
+            <a:fillRef idx="1">
+              <a:schemeClr val="accent1"/>
+            </a:fillRef>
+            <a:effectRef idx="0">
+              <a:schemeClr val="accent1"/>
+            </a:effectRef>
+            <a:fontRef idx="minor">
+              <a:schemeClr val="lt1"/>
+            </a:fontRef>
+          </p:style>
+          <p:txBody>
+            <a:bodyPr rtlCol="0" anchor="ctr"/>
+            <a:lstStyle/>
+            <a:p>
+              <a:pPr algn="ctr"/>
+              <a:endParaRPr lang="en-TW"/>
+            </a:p>
+          </p:txBody>
+        </p:sp>
+        <p:sp>
+          <p:nvSpPr>
+            <p:cNvPr id="6" name="Oval 5">
               <a:extLst>
                 <a:ext uri="{FF2B5EF4-FFF2-40B4-BE49-F238E27FC236}">
-                  <a16:creationId xmlns:a16="http://schemas.microsoft.com/office/drawing/2014/main" id="{2924ACC8-D04C-D4DE-DA9C-A2F2B02E5E77}"/>
+                  <a16:creationId xmlns:a16="http://schemas.microsoft.com/office/drawing/2014/main" id="{0D3ADC91-3D1A-E467-4C00-58DC6F06BB50}"/>
                 </a:ext>
               </a:extLst>
             </p:cNvPr>
-            <p:cNvPicPr>
-              <a:picLocks noChangeAspect="1"/>
-            </p:cNvPicPr>
+            <p:cNvSpPr/>
             <p:nvPr/>
-          </p:nvPicPr>
-          <p:blipFill rotWithShape="1">
-            <a:blip r:embed="rId3"/>
-            <a:srcRect t="28009"/>
-            <a:stretch/>
-          </p:blipFill>
+          </p:nvSpPr>
           <p:spPr>
             <a:xfrm>
-              <a:off x="0" y="3155147"/>
-              <a:ext cx="9144000" cy="3702853"/>
+              <a:off x="930832" y="181173"/>
+              <a:ext cx="362347" cy="362347"/>
             </a:xfrm>
-            <a:prstGeom prst="rect">
+            <a:prstGeom prst="ellipse">
               <a:avLst/>
             </a:prstGeom>
+            <a:solidFill>
+              <a:srgbClr val="FEBD2E"/>
+            </a:solidFill>
+            <a:ln>
+              <a:noFill/>
+            </a:ln>
           </p:spPr>
-        </p:pic>
+          <p:style>
+            <a:lnRef idx="2">
+              <a:schemeClr val="accent1">
+                <a:shade val="15000"/>
+              </a:schemeClr>
+            </a:lnRef>
+            <a:fillRef idx="1">
+              <a:schemeClr val="accent1"/>
+            </a:fillRef>
+            <a:effectRef idx="0">
+              <a:schemeClr val="accent1"/>
+            </a:effectRef>
+            <a:fontRef idx="minor">
+              <a:schemeClr val="lt1"/>
+            </a:fontRef>
+          </p:style>
+          <p:txBody>
+            <a:bodyPr rtlCol="0" anchor="ctr"/>
+            <a:lstStyle/>
+            <a:p>
+              <a:pPr algn="ctr"/>
+              <a:endParaRPr lang="en-TW"/>
+            </a:p>
+          </p:txBody>
+        </p:sp>
+        <p:sp>
+          <p:nvSpPr>
+            <p:cNvPr id="7" name="Oval 6">
+              <a:extLst>
+                <a:ext uri="{FF2B5EF4-FFF2-40B4-BE49-F238E27FC236}">
+                  <a16:creationId xmlns:a16="http://schemas.microsoft.com/office/drawing/2014/main" id="{FE074333-2D3E-C79E-F0B8-D89DB6C4876C}"/>
+                </a:ext>
+              </a:extLst>
+            </p:cNvPr>
+            <p:cNvSpPr/>
+            <p:nvPr/>
+          </p:nvSpPr>
+          <p:spPr>
+            <a:xfrm>
+              <a:off x="1417911" y="181173"/>
+              <a:ext cx="362347" cy="362347"/>
+            </a:xfrm>
+            <a:prstGeom prst="ellipse">
+              <a:avLst/>
+            </a:prstGeom>
+            <a:solidFill>
+              <a:srgbClr val="27C841"/>
+            </a:solidFill>
+            <a:ln>
+              <a:noFill/>
+            </a:ln>
+          </p:spPr>
+          <p:style>
+            <a:lnRef idx="2">
+              <a:schemeClr val="accent1">
+                <a:shade val="15000"/>
+              </a:schemeClr>
+            </a:lnRef>
+            <a:fillRef idx="1">
+              <a:schemeClr val="accent1"/>
+            </a:fillRef>
+            <a:effectRef idx="0">
+              <a:schemeClr val="accent1"/>
+            </a:effectRef>
+            <a:fontRef idx="minor">
+              <a:schemeClr val="lt1"/>
+            </a:fontRef>
+          </p:style>
+          <p:txBody>
+            <a:bodyPr rtlCol="0" anchor="ctr"/>
+            <a:lstStyle/>
+            <a:p>
+              <a:pPr algn="ctr"/>
+              <a:endParaRPr lang="en-TW"/>
+            </a:p>
+          </p:txBody>
+        </p:sp>
       </p:grpSp>
     </p:spTree>
     <p:extLst>
       <p:ext uri="{BB962C8B-B14F-4D97-AF65-F5344CB8AC3E}">
-        <p14:creationId xmlns:p14="http://schemas.microsoft.com/office/powerpoint/2010/main" val="177634898"/>
+        <p14:creationId xmlns:p14="http://schemas.microsoft.com/office/powerpoint/2010/main" val="3439293497"/>
       </p:ext>
     </p:extLst>
   </p:cSld>

</xml_diff>